<commit_message>
Inclusão das etapas 2, 3, 4 e 5
</commit_message>
<xml_diff>
--- a/apresentacoes/Aula7/Etapa2/Etapa2.pptx
+++ b/apresentacoes/Aula7/Etapa2/Etapa2.pptx
@@ -29,14 +29,14 @@
       <p:boldItalic r:id="rId15"/>
     </p:embeddedFont>
     <p:embeddedFont>
-      <p:font typeface="Century Gothic" panose="020B0502020202020204" pitchFamily="34" charset="0"/>
+      <p:font typeface="Proxima Nova" panose="020B0604020202020204" charset="0"/>
       <p:regular r:id="rId16"/>
       <p:bold r:id="rId17"/>
       <p:italic r:id="rId18"/>
       <p:boldItalic r:id="rId19"/>
     </p:embeddedFont>
     <p:embeddedFont>
-      <p:font typeface="Proxima Nova" panose="020B0604020202020204" charset="0"/>
+      <p:font typeface="Century Gothic" panose="020B0502020202020204" pitchFamily="34" charset="0"/>
       <p:regular r:id="rId20"/>
       <p:bold r:id="rId21"/>
       <p:italic r:id="rId22"/>
@@ -288,7 +288,7 @@
       </p15:sldGuideLst>
     </p:ext>
     <p:ext uri="http://customooxmlschemas.google.com/">
-      <go:slidesCustomData xmlns:go="http://customooxmlschemas.google.com/" xmlns:ahyp="http://schemas.microsoft.com/office/drawing/2018/hyperlinkcolor" xmlns:p15="http://schemas.microsoft.com/office/powerpoint/2012/main" xmlns:p14="http://schemas.microsoft.com/office/powerpoint/2010/main" xmlns:com="http://schemas.openxmlformats.org/drawingml/2006/compatibility" xmlns:pvml="urn:schemas-microsoft-com:office:powerpoint" xmlns:v="urn:schemas-microsoft-com:vml" xmlns:o="urn:schemas-microsoft-com:office:office" xmlns:dgm="http://schemas.openxmlformats.org/drawingml/2006/diagram" xmlns:c="http://schemas.openxmlformats.org/drawingml/2006/chart" xmlns:mv="urn:schemas-microsoft-com:mac:vml" xmlns:mc="http://schemas.openxmlformats.org/markup-compatibility/2006" xmlns="" r:id="rId34" roundtripDataSignature="AMtx7mij1fsZUe5V3lBG5qQcqOvrI5UhJw=="/>
+      <go:slidesCustomData xmlns="" xmlns:mc="http://schemas.openxmlformats.org/markup-compatibility/2006" xmlns:mv="urn:schemas-microsoft-com:mac:vml" xmlns:c="http://schemas.openxmlformats.org/drawingml/2006/chart" xmlns:dgm="http://schemas.openxmlformats.org/drawingml/2006/diagram" xmlns:o="urn:schemas-microsoft-com:office:office" xmlns:v="urn:schemas-microsoft-com:vml" xmlns:pvml="urn:schemas-microsoft-com:office:powerpoint" xmlns:com="http://schemas.openxmlformats.org/drawingml/2006/compatibility" xmlns:p14="http://schemas.microsoft.com/office/powerpoint/2010/main" xmlns:p15="http://schemas.microsoft.com/office/powerpoint/2012/main" xmlns:ahyp="http://schemas.microsoft.com/office/drawing/2018/hyperlinkcolor" xmlns:go="http://customooxmlschemas.google.com/" r:id="rId34" roundtripDataSignature="AMtx7mij1fsZUe5V3lBG5qQcqOvrI5UhJw=="/>
     </p:ext>
   </p:extLst>
 </p:presentation>
@@ -639,6 +639,11 @@
         </p:txBody>
       </p:sp>
     </p:spTree>
+    <p:extLst>
+      <p:ext uri="{BB962C8B-B14F-4D97-AF65-F5344CB8AC3E}">
+        <p14:creationId xmlns:p14="http://schemas.microsoft.com/office/powerpoint/2010/main" val="1126210252"/>
+      </p:ext>
+    </p:extLst>
   </p:cSld>
   <p:clrMap bg1="lt1" tx1="dk1" bg2="dk2" tx2="lt2" accent1="accent1" accent2="accent2" accent3="accent3" accent4="accent4" accent5="accent5" accent6="accent6" hlink="hlink" folHlink="folHlink"/>
   <p:notesStyle>
@@ -992,6 +997,11 @@
         </p:txBody>
       </p:sp>
     </p:spTree>
+    <p:extLst>
+      <p:ext uri="{BB962C8B-B14F-4D97-AF65-F5344CB8AC3E}">
+        <p14:creationId xmlns:p14="http://schemas.microsoft.com/office/powerpoint/2010/main" val="623844627"/>
+      </p:ext>
+    </p:extLst>
   </p:cSld>
   <p:clrMapOvr>
     <a:masterClrMapping/>
@@ -1118,6 +1128,11 @@
         </p:txBody>
       </p:sp>
     </p:spTree>
+    <p:extLst>
+      <p:ext uri="{BB962C8B-B14F-4D97-AF65-F5344CB8AC3E}">
+        <p14:creationId xmlns:p14="http://schemas.microsoft.com/office/powerpoint/2010/main" val="922237472"/>
+      </p:ext>
+    </p:extLst>
   </p:cSld>
   <p:clrMapOvr>
     <a:masterClrMapping/>
@@ -1903,6 +1918,11 @@
         </p:txBody>
       </p:sp>
     </p:spTree>
+    <p:extLst>
+      <p:ext uri="{BB962C8B-B14F-4D97-AF65-F5344CB8AC3E}">
+        <p14:creationId xmlns:p14="http://schemas.microsoft.com/office/powerpoint/2010/main" val="2474880639"/>
+      </p:ext>
+    </p:extLst>
   </p:cSld>
   <p:clrMapOvr>
     <a:masterClrMapping/>
@@ -21396,7 +21416,7 @@
         <p:fade/>
       </p:transition>
     </mc:Choice>
-    <mc:Fallback xmlns="" xmlns:mv="urn:schemas-microsoft-com:mac:vml" xmlns:c="http://schemas.openxmlformats.org/drawingml/2006/chart" xmlns:dgm="http://schemas.openxmlformats.org/drawingml/2006/diagram" xmlns:o="urn:schemas-microsoft-com:office:office" xmlns:v="urn:schemas-microsoft-com:vml" xmlns:pvml="urn:schemas-microsoft-com:office:powerpoint" xmlns:com="http://schemas.openxmlformats.org/drawingml/2006/compatibility" xmlns:p15="http://schemas.microsoft.com/office/powerpoint/2012/main" xmlns:ahyp="http://schemas.microsoft.com/office/drawing/2018/hyperlinkcolor">
+    <mc:Fallback xmlns:ahyp="http://schemas.microsoft.com/office/drawing/2018/hyperlinkcolor" xmlns:p15="http://schemas.microsoft.com/office/powerpoint/2012/main" xmlns:com="http://schemas.openxmlformats.org/drawingml/2006/compatibility" xmlns:pvml="urn:schemas-microsoft-com:office:powerpoint" xmlns:v="urn:schemas-microsoft-com:vml" xmlns:o="urn:schemas-microsoft-com:office:office" xmlns:dgm="http://schemas.openxmlformats.org/drawingml/2006/diagram" xmlns:c="http://schemas.openxmlformats.org/drawingml/2006/chart" xmlns:mv="urn:schemas-microsoft-com:mac:vml" xmlns="">
       <p:transition spd="slow">
         <p:fade/>
       </p:transition>
@@ -21935,7 +21955,7 @@
           <p:cNvPr id="4" name="Imagem 3">
             <a:extLst>
               <a:ext uri="{FF2B5EF4-FFF2-40B4-BE49-F238E27FC236}">
-                <a16:creationId xmlns:a16="http://schemas.microsoft.com/office/drawing/2014/main" id="{7CBDA6C0-40C9-4A6E-A6EA-87F71FEC9E49}"/>
+                <a16:creationId xmlns:a16="http://schemas.microsoft.com/office/drawing/2014/main" xmlns="" id="{7CBDA6C0-40C9-4A6E-A6EA-87F71FEC9E49}"/>
               </a:ext>
             </a:extLst>
           </p:cNvPr>
@@ -21976,7 +21996,7 @@
         <p:fade/>
       </p:transition>
     </mc:Choice>
-    <mc:Fallback xmlns:ahyp="http://schemas.microsoft.com/office/drawing/2018/hyperlinkcolor" xmlns:p15="http://schemas.microsoft.com/office/powerpoint/2012/main" xmlns:com="http://schemas.openxmlformats.org/drawingml/2006/compatibility" xmlns:pvml="urn:schemas-microsoft-com:office:powerpoint" xmlns:v="urn:schemas-microsoft-com:vml" xmlns:o="urn:schemas-microsoft-com:office:office" xmlns:dgm="http://schemas.openxmlformats.org/drawingml/2006/diagram" xmlns:c="http://schemas.openxmlformats.org/drawingml/2006/chart" xmlns:mv="urn:schemas-microsoft-com:mac:vml" xmlns="">
+    <mc:Fallback xmlns="" xmlns:mv="urn:schemas-microsoft-com:mac:vml" xmlns:c="http://schemas.openxmlformats.org/drawingml/2006/chart" xmlns:dgm="http://schemas.openxmlformats.org/drawingml/2006/diagram" xmlns:o="urn:schemas-microsoft-com:office:office" xmlns:v="urn:schemas-microsoft-com:vml" xmlns:pvml="urn:schemas-microsoft-com:office:powerpoint" xmlns:com="http://schemas.openxmlformats.org/drawingml/2006/compatibility" xmlns:p15="http://schemas.microsoft.com/office/powerpoint/2012/main" xmlns:ahyp="http://schemas.microsoft.com/office/drawing/2018/hyperlinkcolor">
       <p:transition spd="slow">
         <p:fade/>
       </p:transition>
@@ -22157,7 +22177,7 @@
           <p:cNvPr id="2" name="CaixaDeTexto 1">
             <a:extLst>
               <a:ext uri="{FF2B5EF4-FFF2-40B4-BE49-F238E27FC236}">
-                <a16:creationId xmlns:a16="http://schemas.microsoft.com/office/drawing/2014/main" id="{AAA462F9-7ED7-4070-8DE4-89485A5C52E6}"/>
+                <a16:creationId xmlns:a16="http://schemas.microsoft.com/office/drawing/2014/main" xmlns="" id="{AAA462F9-7ED7-4070-8DE4-89485A5C52E6}"/>
               </a:ext>
             </a:extLst>
           </p:cNvPr>
@@ -22343,7 +22363,7 @@
           <p:cNvPr id="3" name="Picture 2">
             <a:extLst>
               <a:ext uri="{FF2B5EF4-FFF2-40B4-BE49-F238E27FC236}">
-                <a16:creationId xmlns:a16="http://schemas.microsoft.com/office/drawing/2014/main" id="{E52511CC-BFBE-4569-B5E9-215F633F8274}"/>
+                <a16:creationId xmlns:a16="http://schemas.microsoft.com/office/drawing/2014/main" xmlns="" id="{E52511CC-BFBE-4569-B5E9-215F633F8274}"/>
               </a:ext>
             </a:extLst>
           </p:cNvPr>
@@ -22390,7 +22410,7 @@
           <p:cNvPr id="1028" name="Picture 4">
             <a:extLst>
               <a:ext uri="{FF2B5EF4-FFF2-40B4-BE49-F238E27FC236}">
-                <a16:creationId xmlns:a16="http://schemas.microsoft.com/office/drawing/2014/main" id="{65CF2A8A-30CE-42AB-81A7-71CEE68DD0DF}"/>
+                <a16:creationId xmlns:a16="http://schemas.microsoft.com/office/drawing/2014/main" xmlns="" id="{65CF2A8A-30CE-42AB-81A7-71CEE68DD0DF}"/>
               </a:ext>
             </a:extLst>
           </p:cNvPr>
@@ -22437,7 +22457,7 @@
           <p:cNvPr id="9" name="CaixaDeTexto 8">
             <a:extLst>
               <a:ext uri="{FF2B5EF4-FFF2-40B4-BE49-F238E27FC236}">
-                <a16:creationId xmlns:a16="http://schemas.microsoft.com/office/drawing/2014/main" id="{9F6DFA11-B4A3-4F74-8B3D-CA36487C0344}"/>
+                <a16:creationId xmlns:a16="http://schemas.microsoft.com/office/drawing/2014/main" xmlns="" id="{9F6DFA11-B4A3-4F74-8B3D-CA36487C0344}"/>
               </a:ext>
             </a:extLst>
           </p:cNvPr>
@@ -22820,7 +22840,7 @@
           <p:cNvPr id="5" name="Imagem 4">
             <a:extLst>
               <a:ext uri="{FF2B5EF4-FFF2-40B4-BE49-F238E27FC236}">
-                <a16:creationId xmlns:a16="http://schemas.microsoft.com/office/drawing/2014/main" id="{42132828-D80F-4811-96F0-3E5F40559D4B}"/>
+                <a16:creationId xmlns:a16="http://schemas.microsoft.com/office/drawing/2014/main" xmlns="" id="{42132828-D80F-4811-96F0-3E5F40559D4B}"/>
               </a:ext>
             </a:extLst>
           </p:cNvPr>
@@ -22850,7 +22870,7 @@
           <p:cNvPr id="11" name="CaixaDeTexto 10">
             <a:extLst>
               <a:ext uri="{FF2B5EF4-FFF2-40B4-BE49-F238E27FC236}">
-                <a16:creationId xmlns:a16="http://schemas.microsoft.com/office/drawing/2014/main" id="{880BA323-3898-4640-8B2C-7901D2BF9BC1}"/>
+                <a16:creationId xmlns:a16="http://schemas.microsoft.com/office/drawing/2014/main" xmlns="" id="{880BA323-3898-4640-8B2C-7901D2BF9BC1}"/>
               </a:ext>
             </a:extLst>
           </p:cNvPr>
@@ -22932,6 +22952,67 @@
               <a:latin typeface="Calibri" panose="020F0502020204030204" pitchFamily="34" charset="0"/>
               <a:cs typeface="Calibri" panose="020F0502020204030204" pitchFamily="34" charset="0"/>
             </a:endParaRPr>
+          </a:p>
+        </p:txBody>
+      </p:sp>
+      <p:sp>
+        <p:nvSpPr>
+          <p:cNvPr id="7" name="CaixaDeTexto 6">
+            <a:extLst>
+              <a:ext uri="{FF2B5EF4-FFF2-40B4-BE49-F238E27FC236}">
+                <a16:creationId xmlns:a16="http://schemas.microsoft.com/office/drawing/2014/main" xmlns="" id="{36FB006A-C2F7-4326-896E-5D0F723DB52E}"/>
+              </a:ext>
+            </a:extLst>
+          </p:cNvPr>
+          <p:cNvSpPr txBox="1"/>
+          <p:nvPr/>
+        </p:nvSpPr>
+        <p:spPr>
+          <a:xfrm>
+            <a:off x="10618" y="4800718"/>
+            <a:ext cx="9007652" cy="276999"/>
+          </a:xfrm>
+          <a:prstGeom prst="rect">
+            <a:avLst/>
+          </a:prstGeom>
+          <a:noFill/>
+        </p:spPr>
+        <p:txBody>
+          <a:bodyPr wrap="square" rtlCol="0">
+            <a:spAutoFit/>
+          </a:bodyPr>
+          <a:lstStyle/>
+          <a:p>
+            <a:r>
+              <a:rPr lang="pt-BR" sz="1200" dirty="0">
+                <a:solidFill>
+                  <a:srgbClr val="002060"/>
+                </a:solidFill>
+                <a:latin typeface="Calibri" panose="020F0502020204030204" pitchFamily="34" charset="0"/>
+                <a:cs typeface="Calibri" panose="020F0502020204030204" pitchFamily="34" charset="0"/>
+              </a:rPr>
+              <a:t>Fonte: Livro Lógica de Programação e estrutura de dados, Sandra Purga e Gerson </a:t>
+            </a:r>
+            <a:r>
+              <a:rPr lang="pt-BR" sz="1200" dirty="0" err="1">
+                <a:solidFill>
+                  <a:srgbClr val="002060"/>
+                </a:solidFill>
+                <a:latin typeface="Calibri" panose="020F0502020204030204" pitchFamily="34" charset="0"/>
+                <a:cs typeface="Calibri" panose="020F0502020204030204" pitchFamily="34" charset="0"/>
+              </a:rPr>
+              <a:t>Rissetti</a:t>
+            </a:r>
+            <a:r>
+              <a:rPr lang="pt-BR" sz="1200" dirty="0">
+                <a:solidFill>
+                  <a:srgbClr val="002060"/>
+                </a:solidFill>
+                <a:latin typeface="Calibri" panose="020F0502020204030204" pitchFamily="34" charset="0"/>
+                <a:cs typeface="Calibri" panose="020F0502020204030204" pitchFamily="34" charset="0"/>
+              </a:rPr>
+              <a:t>, 3ª Edição </a:t>
+            </a:r>
           </a:p>
         </p:txBody>
       </p:sp>
@@ -23132,7 +23213,7 @@
           <p:cNvPr id="3" name="Imagem 2">
             <a:extLst>
               <a:ext uri="{FF2B5EF4-FFF2-40B4-BE49-F238E27FC236}">
-                <a16:creationId xmlns:a16="http://schemas.microsoft.com/office/drawing/2014/main" id="{4A31A378-CFD6-4A4C-A9D4-103C55E616AD}"/>
+                <a16:creationId xmlns:a16="http://schemas.microsoft.com/office/drawing/2014/main" xmlns="" id="{4A31A378-CFD6-4A4C-A9D4-103C55E616AD}"/>
               </a:ext>
             </a:extLst>
           </p:cNvPr>
@@ -23162,7 +23243,7 @@
           <p:cNvPr id="9" name="Imagem 8">
             <a:extLst>
               <a:ext uri="{FF2B5EF4-FFF2-40B4-BE49-F238E27FC236}">
-                <a16:creationId xmlns:a16="http://schemas.microsoft.com/office/drawing/2014/main" id="{97EAE5F3-4721-4605-A5E9-2655B7555B5A}"/>
+                <a16:creationId xmlns:a16="http://schemas.microsoft.com/office/drawing/2014/main" xmlns="" id="{97EAE5F3-4721-4605-A5E9-2655B7555B5A}"/>
               </a:ext>
             </a:extLst>
           </p:cNvPr>
@@ -23192,7 +23273,7 @@
           <p:cNvPr id="10" name="Imagem 9">
             <a:extLst>
               <a:ext uri="{FF2B5EF4-FFF2-40B4-BE49-F238E27FC236}">
-                <a16:creationId xmlns:a16="http://schemas.microsoft.com/office/drawing/2014/main" id="{FD0E3A05-AACA-47D1-AC92-DC6A59450EEC}"/>
+                <a16:creationId xmlns:a16="http://schemas.microsoft.com/office/drawing/2014/main" xmlns="" id="{FD0E3A05-AACA-47D1-AC92-DC6A59450EEC}"/>
               </a:ext>
             </a:extLst>
           </p:cNvPr>
@@ -23222,7 +23303,7 @@
           <p:cNvPr id="4" name="Seta: Dobrada 3">
             <a:extLst>
               <a:ext uri="{FF2B5EF4-FFF2-40B4-BE49-F238E27FC236}">
-                <a16:creationId xmlns:a16="http://schemas.microsoft.com/office/drawing/2014/main" id="{E41F9A4A-16CE-4945-93B6-828C008E65C4}"/>
+                <a16:creationId xmlns:a16="http://schemas.microsoft.com/office/drawing/2014/main" xmlns="" id="{E41F9A4A-16CE-4945-93B6-828C008E65C4}"/>
               </a:ext>
             </a:extLst>
           </p:cNvPr>
@@ -23285,7 +23366,7 @@
           <p:cNvPr id="12" name="Seta: Dobrada 11">
             <a:extLst>
               <a:ext uri="{FF2B5EF4-FFF2-40B4-BE49-F238E27FC236}">
-                <a16:creationId xmlns:a16="http://schemas.microsoft.com/office/drawing/2014/main" id="{3A52D626-3BE1-4CFA-883E-24707FC976CF}"/>
+                <a16:creationId xmlns:a16="http://schemas.microsoft.com/office/drawing/2014/main" xmlns="" id="{3A52D626-3BE1-4CFA-883E-24707FC976CF}"/>
               </a:ext>
             </a:extLst>
           </p:cNvPr>
@@ -23750,7 +23831,7 @@
           <p:cNvPr id="3" name="Imagem 2">
             <a:extLst>
               <a:ext uri="{FF2B5EF4-FFF2-40B4-BE49-F238E27FC236}">
-                <a16:creationId xmlns:a16="http://schemas.microsoft.com/office/drawing/2014/main" id="{4A31A378-CFD6-4A4C-A9D4-103C55E616AD}"/>
+                <a16:creationId xmlns:a16="http://schemas.microsoft.com/office/drawing/2014/main" xmlns="" id="{4A31A378-CFD6-4A4C-A9D4-103C55E616AD}"/>
               </a:ext>
             </a:extLst>
           </p:cNvPr>
@@ -23780,7 +23861,7 @@
           <p:cNvPr id="9" name="Imagem 8">
             <a:extLst>
               <a:ext uri="{FF2B5EF4-FFF2-40B4-BE49-F238E27FC236}">
-                <a16:creationId xmlns:a16="http://schemas.microsoft.com/office/drawing/2014/main" id="{97EAE5F3-4721-4605-A5E9-2655B7555B5A}"/>
+                <a16:creationId xmlns:a16="http://schemas.microsoft.com/office/drawing/2014/main" xmlns="" id="{97EAE5F3-4721-4605-A5E9-2655B7555B5A}"/>
               </a:ext>
             </a:extLst>
           </p:cNvPr>
@@ -23810,7 +23891,7 @@
           <p:cNvPr id="10" name="Imagem 9">
             <a:extLst>
               <a:ext uri="{FF2B5EF4-FFF2-40B4-BE49-F238E27FC236}">
-                <a16:creationId xmlns:a16="http://schemas.microsoft.com/office/drawing/2014/main" id="{FD0E3A05-AACA-47D1-AC92-DC6A59450EEC}"/>
+                <a16:creationId xmlns:a16="http://schemas.microsoft.com/office/drawing/2014/main" xmlns="" id="{FD0E3A05-AACA-47D1-AC92-DC6A59450EEC}"/>
               </a:ext>
             </a:extLst>
           </p:cNvPr>
@@ -23840,7 +23921,7 @@
           <p:cNvPr id="4" name="Seta: Dobrada 3">
             <a:extLst>
               <a:ext uri="{FF2B5EF4-FFF2-40B4-BE49-F238E27FC236}">
-                <a16:creationId xmlns:a16="http://schemas.microsoft.com/office/drawing/2014/main" id="{E41F9A4A-16CE-4945-93B6-828C008E65C4}"/>
+                <a16:creationId xmlns:a16="http://schemas.microsoft.com/office/drawing/2014/main" xmlns="" id="{E41F9A4A-16CE-4945-93B6-828C008E65C4}"/>
               </a:ext>
             </a:extLst>
           </p:cNvPr>
@@ -23903,7 +23984,7 @@
           <p:cNvPr id="12" name="Seta: Dobrada 11">
             <a:extLst>
               <a:ext uri="{FF2B5EF4-FFF2-40B4-BE49-F238E27FC236}">
-                <a16:creationId xmlns:a16="http://schemas.microsoft.com/office/drawing/2014/main" id="{3A52D626-3BE1-4CFA-883E-24707FC976CF}"/>
+                <a16:creationId xmlns:a16="http://schemas.microsoft.com/office/drawing/2014/main" xmlns="" id="{3A52D626-3BE1-4CFA-883E-24707FC976CF}"/>
               </a:ext>
             </a:extLst>
           </p:cNvPr>
@@ -23966,7 +24047,7 @@
           <p:cNvPr id="11" name="Seta: Dobrada 10">
             <a:extLst>
               <a:ext uri="{FF2B5EF4-FFF2-40B4-BE49-F238E27FC236}">
-                <a16:creationId xmlns:a16="http://schemas.microsoft.com/office/drawing/2014/main" id="{9C2BC210-97F1-4E64-A7AB-34559B48D1A6}"/>
+                <a16:creationId xmlns:a16="http://schemas.microsoft.com/office/drawing/2014/main" xmlns="" id="{9C2BC210-97F1-4E64-A7AB-34559B48D1A6}"/>
               </a:ext>
             </a:extLst>
           </p:cNvPr>
@@ -24029,7 +24110,7 @@
           <p:cNvPr id="13" name="Seta: Dobrada 12">
             <a:extLst>
               <a:ext uri="{FF2B5EF4-FFF2-40B4-BE49-F238E27FC236}">
-                <a16:creationId xmlns:a16="http://schemas.microsoft.com/office/drawing/2014/main" id="{D7AF113F-CE23-430F-9F76-4981FEAD5092}"/>
+                <a16:creationId xmlns:a16="http://schemas.microsoft.com/office/drawing/2014/main" xmlns="" id="{D7AF113F-CE23-430F-9F76-4981FEAD5092}"/>
               </a:ext>
             </a:extLst>
           </p:cNvPr>
@@ -24092,7 +24173,7 @@
           <p:cNvPr id="14" name="Imagem 13">
             <a:extLst>
               <a:ext uri="{FF2B5EF4-FFF2-40B4-BE49-F238E27FC236}">
-                <a16:creationId xmlns:a16="http://schemas.microsoft.com/office/drawing/2014/main" id="{E2889DD5-F68D-4F45-92FF-E4570AA56EF8}"/>
+                <a16:creationId xmlns:a16="http://schemas.microsoft.com/office/drawing/2014/main" xmlns="" id="{E2889DD5-F68D-4F45-92FF-E4570AA56EF8}"/>
               </a:ext>
             </a:extLst>
           </p:cNvPr>
@@ -24122,7 +24203,7 @@
           <p:cNvPr id="15" name="Imagem 14">
             <a:extLst>
               <a:ext uri="{FF2B5EF4-FFF2-40B4-BE49-F238E27FC236}">
-                <a16:creationId xmlns:a16="http://schemas.microsoft.com/office/drawing/2014/main" id="{8D9FADE9-9D50-45D9-BE76-C109F32933D1}"/>
+                <a16:creationId xmlns:a16="http://schemas.microsoft.com/office/drawing/2014/main" xmlns="" id="{8D9FADE9-9D50-45D9-BE76-C109F32933D1}"/>
               </a:ext>
             </a:extLst>
           </p:cNvPr>
@@ -24152,7 +24233,7 @@
           <p:cNvPr id="16" name="Seta: Dobrada 15">
             <a:extLst>
               <a:ext uri="{FF2B5EF4-FFF2-40B4-BE49-F238E27FC236}">
-                <a16:creationId xmlns:a16="http://schemas.microsoft.com/office/drawing/2014/main" id="{CC61D3FB-09FF-4D9D-A855-04437D4C2C12}"/>
+                <a16:creationId xmlns:a16="http://schemas.microsoft.com/office/drawing/2014/main" xmlns="" id="{CC61D3FB-09FF-4D9D-A855-04437D4C2C12}"/>
               </a:ext>
             </a:extLst>
           </p:cNvPr>
@@ -24215,7 +24296,7 @@
           <p:cNvPr id="17" name="Seta: Dobrada 16">
             <a:extLst>
               <a:ext uri="{FF2B5EF4-FFF2-40B4-BE49-F238E27FC236}">
-                <a16:creationId xmlns:a16="http://schemas.microsoft.com/office/drawing/2014/main" id="{3186ABA0-B522-4FE6-8A9E-4F9FA96B6ABE}"/>
+                <a16:creationId xmlns:a16="http://schemas.microsoft.com/office/drawing/2014/main" xmlns="" id="{3186ABA0-B522-4FE6-8A9E-4F9FA96B6ABE}"/>
               </a:ext>
             </a:extLst>
           </p:cNvPr>
@@ -24278,7 +24359,7 @@
           <p:cNvPr id="18" name="Imagem 17">
             <a:extLst>
               <a:ext uri="{FF2B5EF4-FFF2-40B4-BE49-F238E27FC236}">
-                <a16:creationId xmlns:a16="http://schemas.microsoft.com/office/drawing/2014/main" id="{FDF9BF88-5EEC-43FC-B35B-893BA668AF65}"/>
+                <a16:creationId xmlns:a16="http://schemas.microsoft.com/office/drawing/2014/main" xmlns="" id="{FDF9BF88-5EEC-43FC-B35B-893BA668AF65}"/>
               </a:ext>
             </a:extLst>
           </p:cNvPr>
@@ -24308,7 +24389,7 @@
           <p:cNvPr id="19" name="Imagem 18">
             <a:extLst>
               <a:ext uri="{FF2B5EF4-FFF2-40B4-BE49-F238E27FC236}">
-                <a16:creationId xmlns:a16="http://schemas.microsoft.com/office/drawing/2014/main" id="{CE7D83E9-3902-4483-ABE9-A1F821D16E41}"/>
+                <a16:creationId xmlns:a16="http://schemas.microsoft.com/office/drawing/2014/main" xmlns="" id="{CE7D83E9-3902-4483-ABE9-A1F821D16E41}"/>
               </a:ext>
             </a:extLst>
           </p:cNvPr>
@@ -24338,7 +24419,7 @@
           <p:cNvPr id="20" name="Seta: Dobrada 19">
             <a:extLst>
               <a:ext uri="{FF2B5EF4-FFF2-40B4-BE49-F238E27FC236}">
-                <a16:creationId xmlns:a16="http://schemas.microsoft.com/office/drawing/2014/main" id="{E33EA2BA-FFFF-4E5E-A119-22731B2BC296}"/>
+                <a16:creationId xmlns:a16="http://schemas.microsoft.com/office/drawing/2014/main" xmlns="" id="{E33EA2BA-FFFF-4E5E-A119-22731B2BC296}"/>
               </a:ext>
             </a:extLst>
           </p:cNvPr>
@@ -24401,7 +24482,7 @@
           <p:cNvPr id="21" name="Seta: Dobrada 20">
             <a:extLst>
               <a:ext uri="{FF2B5EF4-FFF2-40B4-BE49-F238E27FC236}">
-                <a16:creationId xmlns:a16="http://schemas.microsoft.com/office/drawing/2014/main" id="{38416843-160F-4F19-B34F-6FF7F6E271DB}"/>
+                <a16:creationId xmlns:a16="http://schemas.microsoft.com/office/drawing/2014/main" xmlns="" id="{38416843-160F-4F19-B34F-6FF7F6E271DB}"/>
               </a:ext>
             </a:extLst>
           </p:cNvPr>
@@ -24464,7 +24545,7 @@
           <p:cNvPr id="22" name="Seta: Dobrada 21">
             <a:extLst>
               <a:ext uri="{FF2B5EF4-FFF2-40B4-BE49-F238E27FC236}">
-                <a16:creationId xmlns:a16="http://schemas.microsoft.com/office/drawing/2014/main" id="{77F864C4-2542-4CB9-8B89-6E05BB5F661C}"/>
+                <a16:creationId xmlns:a16="http://schemas.microsoft.com/office/drawing/2014/main" xmlns="" id="{77F864C4-2542-4CB9-8B89-6E05BB5F661C}"/>
               </a:ext>
             </a:extLst>
           </p:cNvPr>
@@ -24527,7 +24608,7 @@
           <p:cNvPr id="23" name="Seta: Dobrada 22">
             <a:extLst>
               <a:ext uri="{FF2B5EF4-FFF2-40B4-BE49-F238E27FC236}">
-                <a16:creationId xmlns:a16="http://schemas.microsoft.com/office/drawing/2014/main" id="{8EA4E260-8196-49CA-8032-4F286A4D1A31}"/>
+                <a16:creationId xmlns:a16="http://schemas.microsoft.com/office/drawing/2014/main" xmlns="" id="{8EA4E260-8196-49CA-8032-4F286A4D1A31}"/>
               </a:ext>
             </a:extLst>
           </p:cNvPr>
@@ -24590,7 +24671,7 @@
           <p:cNvPr id="2" name="CaixaDeTexto 1">
             <a:extLst>
               <a:ext uri="{FF2B5EF4-FFF2-40B4-BE49-F238E27FC236}">
-                <a16:creationId xmlns:a16="http://schemas.microsoft.com/office/drawing/2014/main" id="{CD66C0EC-4E65-44F1-AAA2-31B9B080C77D}"/>
+                <a16:creationId xmlns:a16="http://schemas.microsoft.com/office/drawing/2014/main" xmlns="" id="{CD66C0EC-4E65-44F1-AAA2-31B9B080C77D}"/>
               </a:ext>
             </a:extLst>
           </p:cNvPr>
@@ -24643,7 +24724,7 @@
           <p:cNvPr id="24" name="CaixaDeTexto 23">
             <a:extLst>
               <a:ext uri="{FF2B5EF4-FFF2-40B4-BE49-F238E27FC236}">
-                <a16:creationId xmlns:a16="http://schemas.microsoft.com/office/drawing/2014/main" id="{4D25C85C-3C6A-4A1F-A8F6-1D86D07826E1}"/>
+                <a16:creationId xmlns:a16="http://schemas.microsoft.com/office/drawing/2014/main" xmlns="" id="{4D25C85C-3C6A-4A1F-A8F6-1D86D07826E1}"/>
               </a:ext>
             </a:extLst>
           </p:cNvPr>
@@ -24696,7 +24777,7 @@
           <p:cNvPr id="25" name="CaixaDeTexto 24">
             <a:extLst>
               <a:ext uri="{FF2B5EF4-FFF2-40B4-BE49-F238E27FC236}">
-                <a16:creationId xmlns:a16="http://schemas.microsoft.com/office/drawing/2014/main" id="{E0CF363B-89F8-41DC-B6AF-AD27A0530D95}"/>
+                <a16:creationId xmlns:a16="http://schemas.microsoft.com/office/drawing/2014/main" xmlns="" id="{E0CF363B-89F8-41DC-B6AF-AD27A0530D95}"/>
               </a:ext>
             </a:extLst>
           </p:cNvPr>
@@ -24749,7 +24830,7 @@
           <p:cNvPr id="26" name="CaixaDeTexto 25">
             <a:extLst>
               <a:ext uri="{FF2B5EF4-FFF2-40B4-BE49-F238E27FC236}">
-                <a16:creationId xmlns:a16="http://schemas.microsoft.com/office/drawing/2014/main" id="{FC14A2D6-64B8-461C-902A-E7EC0C2B2325}"/>
+                <a16:creationId xmlns:a16="http://schemas.microsoft.com/office/drawing/2014/main" xmlns="" id="{FC14A2D6-64B8-461C-902A-E7EC0C2B2325}"/>
               </a:ext>
             </a:extLst>
           </p:cNvPr>
@@ -24802,7 +24883,7 @@
           <p:cNvPr id="27" name="Seta: Dobrada 26">
             <a:extLst>
               <a:ext uri="{FF2B5EF4-FFF2-40B4-BE49-F238E27FC236}">
-                <a16:creationId xmlns:a16="http://schemas.microsoft.com/office/drawing/2014/main" id="{2A3EABDE-27FC-405D-8C22-79ACD7BF11E4}"/>
+                <a16:creationId xmlns:a16="http://schemas.microsoft.com/office/drawing/2014/main" xmlns="" id="{2A3EABDE-27FC-405D-8C22-79ACD7BF11E4}"/>
               </a:ext>
             </a:extLst>
           </p:cNvPr>
@@ -24865,7 +24946,7 @@
           <p:cNvPr id="28" name="Seta: Dobrada 27">
             <a:extLst>
               <a:ext uri="{FF2B5EF4-FFF2-40B4-BE49-F238E27FC236}">
-                <a16:creationId xmlns:a16="http://schemas.microsoft.com/office/drawing/2014/main" id="{6BA0C78A-467B-4230-8119-F3CFDF935106}"/>
+                <a16:creationId xmlns:a16="http://schemas.microsoft.com/office/drawing/2014/main" xmlns="" id="{6BA0C78A-467B-4230-8119-F3CFDF935106}"/>
               </a:ext>
             </a:extLst>
           </p:cNvPr>
@@ -24928,7 +25009,7 @@
           <p:cNvPr id="29" name="Seta: Dobrada 28">
             <a:extLst>
               <a:ext uri="{FF2B5EF4-FFF2-40B4-BE49-F238E27FC236}">
-                <a16:creationId xmlns:a16="http://schemas.microsoft.com/office/drawing/2014/main" id="{FE5E3990-5BC8-429A-8F9E-940A43571AE4}"/>
+                <a16:creationId xmlns:a16="http://schemas.microsoft.com/office/drawing/2014/main" xmlns="" id="{FE5E3990-5BC8-429A-8F9E-940A43571AE4}"/>
               </a:ext>
             </a:extLst>
           </p:cNvPr>
@@ -24991,7 +25072,7 @@
           <p:cNvPr id="30" name="Seta: Dobrada 29">
             <a:extLst>
               <a:ext uri="{FF2B5EF4-FFF2-40B4-BE49-F238E27FC236}">
-                <a16:creationId xmlns:a16="http://schemas.microsoft.com/office/drawing/2014/main" id="{80F1B799-0794-4501-8B02-94962BE08369}"/>
+                <a16:creationId xmlns:a16="http://schemas.microsoft.com/office/drawing/2014/main" xmlns="" id="{80F1B799-0794-4501-8B02-94962BE08369}"/>
               </a:ext>
             </a:extLst>
           </p:cNvPr>
@@ -25054,7 +25135,7 @@
           <p:cNvPr id="31" name="CaixaDeTexto 30">
             <a:extLst>
               <a:ext uri="{FF2B5EF4-FFF2-40B4-BE49-F238E27FC236}">
-                <a16:creationId xmlns:a16="http://schemas.microsoft.com/office/drawing/2014/main" id="{4C8DE1E8-2D7C-4893-B4F6-88BCC652E02E}"/>
+                <a16:creationId xmlns:a16="http://schemas.microsoft.com/office/drawing/2014/main" xmlns="" id="{4C8DE1E8-2D7C-4893-B4F6-88BCC652E02E}"/>
               </a:ext>
             </a:extLst>
           </p:cNvPr>
@@ -25107,7 +25188,7 @@
           <p:cNvPr id="32" name="CaixaDeTexto 31">
             <a:extLst>
               <a:ext uri="{FF2B5EF4-FFF2-40B4-BE49-F238E27FC236}">
-                <a16:creationId xmlns:a16="http://schemas.microsoft.com/office/drawing/2014/main" id="{594AEDDB-04AF-49B7-8934-65F53517D675}"/>
+                <a16:creationId xmlns:a16="http://schemas.microsoft.com/office/drawing/2014/main" xmlns="" id="{594AEDDB-04AF-49B7-8934-65F53517D675}"/>
               </a:ext>
             </a:extLst>
           </p:cNvPr>
@@ -25160,7 +25241,7 @@
           <p:cNvPr id="33" name="CaixaDeTexto 32">
             <a:extLst>
               <a:ext uri="{FF2B5EF4-FFF2-40B4-BE49-F238E27FC236}">
-                <a16:creationId xmlns:a16="http://schemas.microsoft.com/office/drawing/2014/main" id="{E180294E-3E7D-488A-A823-80F6E8F0D812}"/>
+                <a16:creationId xmlns:a16="http://schemas.microsoft.com/office/drawing/2014/main" xmlns="" id="{E180294E-3E7D-488A-A823-80F6E8F0D812}"/>
               </a:ext>
             </a:extLst>
           </p:cNvPr>
@@ -25213,7 +25294,7 @@
           <p:cNvPr id="34" name="CaixaDeTexto 33">
             <a:extLst>
               <a:ext uri="{FF2B5EF4-FFF2-40B4-BE49-F238E27FC236}">
-                <a16:creationId xmlns:a16="http://schemas.microsoft.com/office/drawing/2014/main" id="{AB4C56B5-2D02-4A00-BA33-D01A5C4F7297}"/>
+                <a16:creationId xmlns:a16="http://schemas.microsoft.com/office/drawing/2014/main" xmlns="" id="{AB4C56B5-2D02-4A00-BA33-D01A5C4F7297}"/>
               </a:ext>
             </a:extLst>
           </p:cNvPr>
@@ -25271,13 +25352,13 @@
   <p:clrMapOvr>
     <a:masterClrMapping/>
   </p:clrMapOvr>
-  <mc:AlternateContent xmlns:mc="http://schemas.openxmlformats.org/markup-compatibility/2006">
-    <mc:Choice xmlns:p14="http://schemas.microsoft.com/office/powerpoint/2010/main" Requires="p14">
+  <mc:AlternateContent xmlns:mc="http://schemas.openxmlformats.org/markup-compatibility/2006" xmlns:p14="http://schemas.microsoft.com/office/powerpoint/2010/main">
+    <mc:Choice Requires="p14">
       <p:transition spd="med" p14:dur="700">
         <p:fade/>
       </p:transition>
     </mc:Choice>
-    <mc:Fallback>
+    <mc:Fallback xmlns="">
       <p:transition spd="med">
         <p:fade/>
       </p:transition>
@@ -27991,7 +28072,7 @@
                 <a:hlinkClick r:id="rId4">
                   <a:extLst>
                     <a:ext uri="{A12FA001-AC4F-418D-AE19-62706E023703}">
-                      <ahyp:hlinkClr xmlns:ahyp="http://schemas.microsoft.com/office/drawing/2018/hyperlinkcolor" val="tx"/>
+                      <ahyp:hlinkClr xmlns:ahyp="http://schemas.microsoft.com/office/drawing/2018/hyperlinkcolor" xmlns="" val="tx"/>
                     </a:ext>
                   </a:extLst>
                 </a:hlinkClick>
@@ -28015,7 +28096,7 @@
           <p:cNvPr id="14" name="Imagem 13">
             <a:extLst>
               <a:ext uri="{FF2B5EF4-FFF2-40B4-BE49-F238E27FC236}">
-                <a16:creationId xmlns:a16="http://schemas.microsoft.com/office/drawing/2014/main" id="{75728100-D2C6-4D0B-BE34-B066BE471AF3}"/>
+                <a16:creationId xmlns:a16="http://schemas.microsoft.com/office/drawing/2014/main" xmlns="" id="{75728100-D2C6-4D0B-BE34-B066BE471AF3}"/>
               </a:ext>
             </a:extLst>
           </p:cNvPr>
@@ -28051,7 +28132,7 @@
         <p:fade/>
       </p:transition>
     </mc:Choice>
-    <mc:Fallback xmlns:ahyp="http://schemas.microsoft.com/office/drawing/2018/hyperlinkcolor" xmlns:p15="http://schemas.microsoft.com/office/powerpoint/2012/main" xmlns:com="http://schemas.openxmlformats.org/drawingml/2006/compatibility" xmlns:pvml="urn:schemas-microsoft-com:office:powerpoint" xmlns:v="urn:schemas-microsoft-com:vml" xmlns:o="urn:schemas-microsoft-com:office:office" xmlns:dgm="http://schemas.openxmlformats.org/drawingml/2006/diagram" xmlns:c="http://schemas.openxmlformats.org/drawingml/2006/chart" xmlns:mv="urn:schemas-microsoft-com:mac:vml" xmlns="">
+    <mc:Fallback xmlns="" xmlns:mv="urn:schemas-microsoft-com:mac:vml" xmlns:c="http://schemas.openxmlformats.org/drawingml/2006/chart" xmlns:dgm="http://schemas.openxmlformats.org/drawingml/2006/diagram" xmlns:o="urn:schemas-microsoft-com:office:office" xmlns:v="urn:schemas-microsoft-com:vml" xmlns:pvml="urn:schemas-microsoft-com:office:powerpoint" xmlns:com="http://schemas.openxmlformats.org/drawingml/2006/compatibility" xmlns:p15="http://schemas.microsoft.com/office/powerpoint/2012/main" xmlns:ahyp="http://schemas.microsoft.com/office/drawing/2018/hyperlinkcolor">
       <p:transition spd="slow">
         <p:fade/>
       </p:transition>

</xml_diff>